<commit_message>
Clases y links de videos agregados
</commit_message>
<xml_diff>
--- a/Clases/01. Selection & Insertion sort.pptx
+++ b/Clases/01. Selection & Insertion sort.pptx
@@ -5,7 +5,7 @@
     <p:sldMasterId id="2147484134" r:id="rId1"/>
   </p:sldMasterIdLst>
   <p:notesMasterIdLst>
-    <p:notesMasterId r:id="rId21"/>
+    <p:notesMasterId r:id="rId24"/>
   </p:notesMasterIdLst>
   <p:sldIdLst>
     <p:sldId id="256" r:id="rId2"/>
@@ -22,11 +22,14 @@
     <p:sldId id="267" r:id="rId13"/>
     <p:sldId id="273" r:id="rId14"/>
     <p:sldId id="268" r:id="rId15"/>
-    <p:sldId id="276" r:id="rId16"/>
-    <p:sldId id="270" r:id="rId17"/>
-    <p:sldId id="277" r:id="rId18"/>
-    <p:sldId id="278" r:id="rId19"/>
-    <p:sldId id="279" r:id="rId20"/>
+    <p:sldId id="269" r:id="rId16"/>
+    <p:sldId id="274" r:id="rId17"/>
+    <p:sldId id="275" r:id="rId18"/>
+    <p:sldId id="276" r:id="rId19"/>
+    <p:sldId id="270" r:id="rId20"/>
+    <p:sldId id="277" r:id="rId21"/>
+    <p:sldId id="278" r:id="rId22"/>
+    <p:sldId id="279" r:id="rId23"/>
   </p:sldIdLst>
   <p:sldSz cx="9144000" cy="6858000" type="screen4x3"/>
   <p:notesSz cx="6858000" cy="9144000"/>
@@ -226,7 +229,7 @@
           <a:p>
             <a:fld id="{579E0E46-57CA-481B-89BF-5F4E81B63934}" type="datetimeFigureOut">
               <a:rPr lang="es-CL" smtClean="0"/>
-              <a:t>12-08-2019</a:t>
+              <a:t>18-03-2020</a:t>
             </a:fld>
             <a:endParaRPr lang="es-CL"/>
           </a:p>
@@ -709,7 +712,7 @@
           <a:bodyPr/>
           <a:lstStyle/>
           <a:p>
-            <a:endParaRPr lang="es-CL" dirty="0"/>
+            <a:endParaRPr lang="es-CL" b="1" dirty="0"/>
           </a:p>
         </p:txBody>
       </p:sp>
@@ -728,7 +731,7 @@
           <a:bodyPr/>
           <a:lstStyle/>
           <a:p>
-            <a:fld id="{DF52B28F-3846-4A65-A7CF-CEB88539B6AF}" type="slidenum">
+            <a:fld id="{9AC18598-3AE0-4714-BC26-A1084708E211}" type="slidenum">
               <a:rPr lang="es-CL" smtClean="0"/>
               <a:t>15</a:t>
             </a:fld>
@@ -739,7 +742,7 @@
     </p:spTree>
     <p:extLst>
       <p:ext uri="{BB962C8B-B14F-4D97-AF65-F5344CB8AC3E}">
-        <p14:creationId xmlns:p14="http://schemas.microsoft.com/office/powerpoint/2010/main" val="399601501"/>
+        <p14:creationId xmlns:p14="http://schemas.microsoft.com/office/powerpoint/2010/main" val="1426497821"/>
       </p:ext>
     </p:extLst>
   </p:cSld>
@@ -793,7 +796,10 @@
           <a:bodyPr/>
           <a:lstStyle/>
           <a:p>
-            <a:endParaRPr lang="es-CL" b="0" dirty="0"/>
+            <a:r>
+              <a:rPr lang="es-CL" dirty="0"/>
+              <a:t>El problema de esto es como definimos la inserción</a:t>
+            </a:r>
           </a:p>
         </p:txBody>
       </p:sp>
@@ -812,9 +818,177 @@
           <a:bodyPr/>
           <a:lstStyle/>
           <a:p>
+            <a:fld id="{DF52B28F-3846-4A65-A7CF-CEB88539B6AF}" type="slidenum">
+              <a:rPr lang="es-CL" smtClean="0"/>
+              <a:t>17</a:t>
+            </a:fld>
+            <a:endParaRPr lang="es-CL"/>
+          </a:p>
+        </p:txBody>
+      </p:sp>
+    </p:spTree>
+    <p:extLst>
+      <p:ext uri="{BB962C8B-B14F-4D97-AF65-F5344CB8AC3E}">
+        <p14:creationId xmlns:p14="http://schemas.microsoft.com/office/powerpoint/2010/main" val="3302730543"/>
+      </p:ext>
+    </p:extLst>
+  </p:cSld>
+  <p:clrMapOvr>
+    <a:masterClrMapping/>
+  </p:clrMapOvr>
+</p:notes>
+</file>
+
+<file path=ppt/notesSlides/notesSlide13.xml><?xml version="1.0" encoding="utf-8"?>
+<p:notes xmlns:a="http://schemas.openxmlformats.org/drawingml/2006/main" xmlns:r="http://schemas.openxmlformats.org/officeDocument/2006/relationships" xmlns:p="http://schemas.openxmlformats.org/presentationml/2006/main">
+  <p:cSld>
+    <p:spTree>
+      <p:nvGrpSpPr>
+        <p:cNvPr id="1" name=""/>
+        <p:cNvGrpSpPr/>
+        <p:nvPr/>
+      </p:nvGrpSpPr>
+      <p:grpSpPr>
+        <a:xfrm>
+          <a:off x="0" y="0"/>
+          <a:ext cx="0" cy="0"/>
+          <a:chOff x="0" y="0"/>
+          <a:chExt cx="0" cy="0"/>
+        </a:xfrm>
+      </p:grpSpPr>
+      <p:sp>
+        <p:nvSpPr>
+          <p:cNvPr id="2" name="Slide Image Placeholder 1"/>
+          <p:cNvSpPr>
+            <a:spLocks noGrp="1" noRot="1" noChangeAspect="1"/>
+          </p:cNvSpPr>
+          <p:nvPr>
+            <p:ph type="sldImg"/>
+          </p:nvPr>
+        </p:nvSpPr>
+        <p:spPr/>
+      </p:sp>
+      <p:sp>
+        <p:nvSpPr>
+          <p:cNvPr id="3" name="Notes Placeholder 2"/>
+          <p:cNvSpPr>
+            <a:spLocks noGrp="1"/>
+          </p:cNvSpPr>
+          <p:nvPr>
+            <p:ph type="body" idx="1"/>
+          </p:nvPr>
+        </p:nvSpPr>
+        <p:spPr/>
+        <p:txBody>
+          <a:bodyPr/>
+          <a:lstStyle/>
+          <a:p>
+            <a:endParaRPr lang="es-CL" dirty="0"/>
+          </a:p>
+        </p:txBody>
+      </p:sp>
+      <p:sp>
+        <p:nvSpPr>
+          <p:cNvPr id="4" name="Slide Number Placeholder 3"/>
+          <p:cNvSpPr>
+            <a:spLocks noGrp="1"/>
+          </p:cNvSpPr>
+          <p:nvPr>
+            <p:ph type="sldNum" sz="quarter" idx="10"/>
+          </p:nvPr>
+        </p:nvSpPr>
+        <p:spPr/>
+        <p:txBody>
+          <a:bodyPr/>
+          <a:lstStyle/>
+          <a:p>
+            <a:fld id="{DF52B28F-3846-4A65-A7CF-CEB88539B6AF}" type="slidenum">
+              <a:rPr lang="es-CL" smtClean="0"/>
+              <a:t>18</a:t>
+            </a:fld>
+            <a:endParaRPr lang="es-CL"/>
+          </a:p>
+        </p:txBody>
+      </p:sp>
+    </p:spTree>
+    <p:extLst>
+      <p:ext uri="{BB962C8B-B14F-4D97-AF65-F5344CB8AC3E}">
+        <p14:creationId xmlns:p14="http://schemas.microsoft.com/office/powerpoint/2010/main" val="399601501"/>
+      </p:ext>
+    </p:extLst>
+  </p:cSld>
+  <p:clrMapOvr>
+    <a:masterClrMapping/>
+  </p:clrMapOvr>
+</p:notes>
+</file>
+
+<file path=ppt/notesSlides/notesSlide14.xml><?xml version="1.0" encoding="utf-8"?>
+<p:notes xmlns:a="http://schemas.openxmlformats.org/drawingml/2006/main" xmlns:r="http://schemas.openxmlformats.org/officeDocument/2006/relationships" xmlns:p="http://schemas.openxmlformats.org/presentationml/2006/main">
+  <p:cSld>
+    <p:spTree>
+      <p:nvGrpSpPr>
+        <p:cNvPr id="1" name=""/>
+        <p:cNvGrpSpPr/>
+        <p:nvPr/>
+      </p:nvGrpSpPr>
+      <p:grpSpPr>
+        <a:xfrm>
+          <a:off x="0" y="0"/>
+          <a:ext cx="0" cy="0"/>
+          <a:chOff x="0" y="0"/>
+          <a:chExt cx="0" cy="0"/>
+        </a:xfrm>
+      </p:grpSpPr>
+      <p:sp>
+        <p:nvSpPr>
+          <p:cNvPr id="2" name="Slide Image Placeholder 1"/>
+          <p:cNvSpPr>
+            <a:spLocks noGrp="1" noRot="1" noChangeAspect="1"/>
+          </p:cNvSpPr>
+          <p:nvPr>
+            <p:ph type="sldImg"/>
+          </p:nvPr>
+        </p:nvSpPr>
+        <p:spPr/>
+      </p:sp>
+      <p:sp>
+        <p:nvSpPr>
+          <p:cNvPr id="3" name="Notes Placeholder 2"/>
+          <p:cNvSpPr>
+            <a:spLocks noGrp="1"/>
+          </p:cNvSpPr>
+          <p:nvPr>
+            <p:ph type="body" idx="1"/>
+          </p:nvPr>
+        </p:nvSpPr>
+        <p:spPr/>
+        <p:txBody>
+          <a:bodyPr/>
+          <a:lstStyle/>
+          <a:p>
+            <a:endParaRPr lang="es-CL" b="0" dirty="0"/>
+          </a:p>
+        </p:txBody>
+      </p:sp>
+      <p:sp>
+        <p:nvSpPr>
+          <p:cNvPr id="4" name="Slide Number Placeholder 3"/>
+          <p:cNvSpPr>
+            <a:spLocks noGrp="1"/>
+          </p:cNvSpPr>
+          <p:nvPr>
+            <p:ph type="sldNum" sz="quarter" idx="10"/>
+          </p:nvPr>
+        </p:nvSpPr>
+        <p:spPr/>
+        <p:txBody>
+          <a:bodyPr/>
+          <a:lstStyle/>
+          <a:p>
             <a:fld id="{9AC18598-3AE0-4714-BC26-A1084708E211}" type="slidenum">
               <a:rPr lang="es-CL" smtClean="0"/>
-              <a:t>16</a:t>
+              <a:t>19</a:t>
             </a:fld>
             <a:endParaRPr lang="es-CL"/>
           </a:p>
@@ -3362,7 +3536,7 @@
       </a:lvl9pPr>
     </p:otherStyle>
   </p:txStyles>
-  <p:extLst mod="1">
+  <p:extLst>
     <p:ext uri="{27BBF7A9-308A-43DC-89C8-2F10F3537804}">
       <p15:sldGuideLst xmlns:p15="http://schemas.microsoft.com/office/powerpoint/2012/main"/>
     </p:ext>
@@ -4910,7 +5084,7 @@
           <p:cNvPr id="2" name="Title 1">
             <a:extLst>
               <a:ext uri="{FF2B5EF4-FFF2-40B4-BE49-F238E27FC236}">
-                <a16:creationId xmlns:a16="http://schemas.microsoft.com/office/drawing/2014/main" id="{569E5831-E37D-4180-A88F-80168EF1427C}"/>
+                <a16:creationId xmlns:a16="http://schemas.microsoft.com/office/drawing/2014/main" id="{232649FA-7B44-43DF-BE6B-697D23F41015}"/>
               </a:ext>
             </a:extLst>
           </p:cNvPr>
@@ -4923,25 +5097,22 @@
         </p:nvSpPr>
         <p:spPr/>
         <p:txBody>
-          <a:bodyPr>
-            <a:normAutofit/>
-          </a:bodyPr>
+          <a:bodyPr/>
           <a:lstStyle/>
           <a:p>
             <a:r>
-              <a:rPr lang="es-CL"/>
-              <a:t>¿Cómo se hace una inserción?</a:t>
-            </a:r>
-            <a:endParaRPr lang="es-CL" dirty="0"/>
+              <a:rPr lang="es-CL" dirty="0"/>
+              <a:t>Insertion Sort</a:t>
+            </a:r>
           </a:p>
         </p:txBody>
       </p:sp>
       <p:sp>
         <p:nvSpPr>
-          <p:cNvPr id="4" name="Content Placeholder 3">
+          <p:cNvPr id="3" name="Content Placeholder 2">
             <a:extLst>
               <a:ext uri="{FF2B5EF4-FFF2-40B4-BE49-F238E27FC236}">
-                <a16:creationId xmlns:a16="http://schemas.microsoft.com/office/drawing/2014/main" id="{15693FFC-207A-4FF8-B2AE-E9F5389A2A92}"/>
+                <a16:creationId xmlns:a16="http://schemas.microsoft.com/office/drawing/2014/main" id="{49572EA8-0A15-47C8-8D54-18B7EA8A7EC5}"/>
               </a:ext>
             </a:extLst>
           </p:cNvPr>
@@ -4952,92 +5123,74 @@
             <p:ph idx="1"/>
           </p:nvPr>
         </p:nvSpPr>
-        <p:spPr>
-          <a:xfrm>
-            <a:off x="251461" y="1824419"/>
-            <a:ext cx="8641076" cy="4273222"/>
-          </a:xfrm>
-        </p:spPr>
+        <p:spPr/>
         <p:txBody>
-          <a:bodyPr anchor="ctr">
+          <a:bodyPr>
             <a:normAutofit/>
           </a:bodyPr>
           <a:lstStyle/>
           <a:p>
-            <a:pPr>
-              <a:lnSpc>
-                <a:spcPct val="100000"/>
-              </a:lnSpc>
+            <a:pPr marL="0" indent="0">
+              <a:buNone/>
             </a:pPr>
-            <a:r>
-              <a:rPr lang="es-CL" dirty="0"/>
-              <a:t>Depende de la estructura de datos usada para almacenar la lista</a:t>
-            </a:r>
-          </a:p>
-          <a:p>
-            <a:pPr>
-              <a:lnSpc>
-                <a:spcPct val="100000"/>
-              </a:lnSpc>
+            <a:endParaRPr lang="es-CL" dirty="0">
+              <a:solidFill>
+                <a:schemeClr val="tx1"/>
+              </a:solidFill>
+            </a:endParaRPr>
+          </a:p>
+          <a:p>
+            <a:pPr marL="0" indent="0">
+              <a:buNone/>
             </a:pPr>
-            <a:endParaRPr lang="es-CL" dirty="0"/>
-          </a:p>
-          <a:p>
-            <a:pPr>
-              <a:lnSpc>
-                <a:spcPct val="100000"/>
-              </a:lnSpc>
-            </a:pPr>
-            <a:r>
-              <a:rPr lang="es-CL" dirty="0"/>
-              <a:t>Se suele usar </a:t>
-            </a:r>
-            <a:r>
-              <a:rPr lang="es-CL" b="1" dirty="0">
+            <a:r>
+              <a:rPr lang="es-CL" dirty="0">
                 <a:solidFill>
-                  <a:schemeClr val="accent2"/>
+                  <a:schemeClr val="tx1"/>
                 </a:solidFill>
               </a:rPr>
-              <a:t>arreglos</a:t>
-            </a:r>
-            <a:r>
-              <a:rPr lang="es-CL" dirty="0"/>
-              <a:t>, pero también se puede usar </a:t>
-            </a:r>
-            <a:r>
-              <a:rPr lang="es-CL" b="1" dirty="0">
+              <a:t>Insertion Sort es correcto</a:t>
+            </a:r>
+          </a:p>
+          <a:p>
+            <a:pPr marL="0" indent="0">
+              <a:buNone/>
+            </a:pPr>
+            <a:endParaRPr lang="es-CL" dirty="0">
+              <a:solidFill>
+                <a:schemeClr val="tx1"/>
+              </a:solidFill>
+            </a:endParaRPr>
+          </a:p>
+          <a:p>
+            <a:pPr marL="0" indent="0">
+              <a:buNone/>
+            </a:pPr>
+            <a:r>
+              <a:rPr lang="es-CL" dirty="0">
                 <a:solidFill>
-                  <a:schemeClr val="accent2"/>
+                  <a:schemeClr val="tx1"/>
                 </a:solidFill>
               </a:rPr>
-              <a:t>listas ligadas</a:t>
-            </a:r>
-          </a:p>
-          <a:p>
-            <a:pPr>
-              <a:lnSpc>
-                <a:spcPct val="100000"/>
-              </a:lnSpc>
+              <a:t>Podemos demostrarlo por inducción</a:t>
+            </a:r>
+          </a:p>
+          <a:p>
+            <a:pPr marL="0" indent="0">
+              <a:buNone/>
             </a:pPr>
-            <a:endParaRPr lang="es-CL" dirty="0"/>
-          </a:p>
-          <a:p>
-            <a:pPr>
-              <a:lnSpc>
-                <a:spcPct val="100000"/>
-              </a:lnSpc>
-            </a:pPr>
-            <a:r>
-              <a:rPr lang="es-CL" dirty="0"/>
-              <a:t>En cualquier caso, el algoritmo no necesita memoria adicional</a:t>
-            </a:r>
+            <a:endParaRPr lang="es-CL" dirty="0">
+              <a:solidFill>
+                <a:schemeClr val="tx1"/>
+              </a:solidFill>
+            </a:endParaRPr>
           </a:p>
         </p:txBody>
       </p:sp>
     </p:spTree>
     <p:extLst>
       <p:ext uri="{BB962C8B-B14F-4D97-AF65-F5344CB8AC3E}">
-        <p14:creationId xmlns:p14="http://schemas.microsoft.com/office/powerpoint/2010/main" val="2362549278"/>
+        <p14:creationId xmlns:p14="http://schemas.microsoft.com/office/powerpoint/2010/main" val="3816671913"/>
       </p:ext>
     </p:extLst>
   </p:cSld>
@@ -5069,6 +5222,844 @@
           <p:cNvPr id="2" name="Title 1">
             <a:extLst>
               <a:ext uri="{FF2B5EF4-FFF2-40B4-BE49-F238E27FC236}">
+                <a16:creationId xmlns:a16="http://schemas.microsoft.com/office/drawing/2014/main" id="{699C118A-2F9B-4293-8EA7-CC54AD5A3540}"/>
+              </a:ext>
+            </a:extLst>
+          </p:cNvPr>
+          <p:cNvSpPr>
+            <a:spLocks noGrp="1"/>
+          </p:cNvSpPr>
+          <p:nvPr>
+            <p:ph type="title"/>
+          </p:nvPr>
+        </p:nvSpPr>
+        <p:spPr/>
+        <p:txBody>
+          <a:bodyPr/>
+          <a:lstStyle/>
+          <a:p>
+            <a:r>
+              <a:rPr lang="es-CL" dirty="0"/>
+              <a:t>Finitud</a:t>
+            </a:r>
+          </a:p>
+        </p:txBody>
+      </p:sp>
+      <mc:AlternateContent xmlns:mc="http://schemas.openxmlformats.org/markup-compatibility/2006" xmlns:a14="http://schemas.microsoft.com/office/drawing/2010/main">
+        <mc:Choice Requires="a14">
+          <p:sp>
+            <p:nvSpPr>
+              <p:cNvPr id="3" name="Content Placeholder 2">
+                <a:extLst>
+                  <a:ext uri="{FF2B5EF4-FFF2-40B4-BE49-F238E27FC236}">
+                    <a16:creationId xmlns:a16="http://schemas.microsoft.com/office/drawing/2014/main" id="{C9B5215C-8FC1-4DE1-A37C-15A1BFE21E0E}"/>
+                  </a:ext>
+                </a:extLst>
+              </p:cNvPr>
+              <p:cNvSpPr>
+                <a:spLocks noGrp="1"/>
+              </p:cNvSpPr>
+              <p:nvPr>
+                <p:ph idx="1"/>
+              </p:nvPr>
+            </p:nvSpPr>
+            <p:spPr/>
+            <p:txBody>
+              <a:bodyPr>
+                <a:normAutofit fontScale="92500" lnSpcReduction="20000"/>
+              </a:bodyPr>
+              <a:lstStyle/>
+              <a:p>
+                <a:r>
+                  <a:rPr lang="es-CL" dirty="0"/>
+                  <a:t>En cada paso se saca un elemento de </a:t>
+                </a:r>
+                <a14:m>
+                  <m:oMath xmlns:m="http://schemas.openxmlformats.org/officeDocument/2006/math">
+                    <m:r>
+                      <a:rPr lang="es-CL" b="0" i="1" smtClean="0">
+                        <a:latin typeface="Cambria Math" panose="02040503050406030204" pitchFamily="18" charset="0"/>
+                      </a:rPr>
+                      <m:t>𝐴</m:t>
+                    </m:r>
+                  </m:oMath>
+                </a14:m>
+                <a:endParaRPr lang="es-CL" dirty="0"/>
+              </a:p>
+              <a:p>
+                <a:endParaRPr lang="es-CL" dirty="0"/>
+              </a:p>
+              <a:p>
+                <a:r>
+                  <a:rPr lang="es-CL" dirty="0"/>
+                  <a:t>Cuando no quedan elementos en </a:t>
+                </a:r>
+                <a14:m>
+                  <m:oMath xmlns:m="http://schemas.openxmlformats.org/officeDocument/2006/math">
+                    <m:r>
+                      <a:rPr lang="es-CL" b="0" i="1" smtClean="0">
+                        <a:latin typeface="Cambria Math" panose="02040503050406030204" pitchFamily="18" charset="0"/>
+                      </a:rPr>
+                      <m:t>𝐴</m:t>
+                    </m:r>
+                  </m:oMath>
+                </a14:m>
+                <a:r>
+                  <a:rPr lang="es-CL" dirty="0"/>
+                  <a:t>, el algoritmo termina</a:t>
+                </a:r>
+              </a:p>
+              <a:p>
+                <a:endParaRPr lang="es-CL" dirty="0"/>
+              </a:p>
+              <a:p>
+                <a:r>
+                  <a:rPr lang="es-CL" dirty="0"/>
+                  <a:t>La inserción requiere como máximo recorrer todo </a:t>
+                </a:r>
+                <a14:m>
+                  <m:oMath xmlns:m="http://schemas.openxmlformats.org/officeDocument/2006/math">
+                    <m:r>
+                      <a:rPr lang="es-CL" b="0" i="1" smtClean="0">
+                        <a:latin typeface="Cambria Math" panose="02040503050406030204" pitchFamily="18" charset="0"/>
+                      </a:rPr>
+                      <m:t>𝐵</m:t>
+                    </m:r>
+                  </m:oMath>
+                </a14:m>
+                <a:endParaRPr lang="es-CL" dirty="0"/>
+              </a:p>
+              <a:p>
+                <a:endParaRPr lang="es-CL" dirty="0"/>
+              </a:p>
+              <a:p>
+                <a:r>
+                  <a:rPr lang="es-CL" dirty="0"/>
+                  <a:t>Como </a:t>
+                </a:r>
+                <a14:m>
+                  <m:oMath xmlns:m="http://schemas.openxmlformats.org/officeDocument/2006/math">
+                    <m:r>
+                      <a:rPr lang="es-CL" b="0" i="1" smtClean="0">
+                        <a:latin typeface="Cambria Math" panose="02040503050406030204" pitchFamily="18" charset="0"/>
+                      </a:rPr>
+                      <m:t>𝐴</m:t>
+                    </m:r>
+                  </m:oMath>
+                </a14:m>
+                <a:r>
+                  <a:rPr lang="es-CL" dirty="0"/>
+                  <a:t> y </a:t>
+                </a:r>
+                <a14:m>
+                  <m:oMath xmlns:m="http://schemas.openxmlformats.org/officeDocument/2006/math">
+                    <m:r>
+                      <a:rPr lang="es-CL" b="0" i="1" smtClean="0">
+                        <a:latin typeface="Cambria Math" panose="02040503050406030204" pitchFamily="18" charset="0"/>
+                      </a:rPr>
+                      <m:t>𝐵</m:t>
+                    </m:r>
+                  </m:oMath>
+                </a14:m>
+                <a:r>
+                  <a:rPr lang="es-CL" dirty="0"/>
+                  <a:t> son finitos, el algoritmo termina en tiempo finito</a:t>
+                </a:r>
+              </a:p>
+              <a:p>
+                <a:endParaRPr lang="es-CL" dirty="0"/>
+              </a:p>
+              <a:p>
+                <a:endParaRPr lang="es-CL" dirty="0"/>
+              </a:p>
+            </p:txBody>
+          </p:sp>
+        </mc:Choice>
+        <mc:Fallback xmlns="">
+          <p:sp>
+            <p:nvSpPr>
+              <p:cNvPr id="3" name="Content Placeholder 2">
+                <a:extLst>
+                  <a:ext uri="{FF2B5EF4-FFF2-40B4-BE49-F238E27FC236}">
+                    <a16:creationId xmlns:a16="http://schemas.microsoft.com/office/drawing/2014/main" id="{C9B5215C-8FC1-4DE1-A37C-15A1BFE21E0E}"/>
+                  </a:ext>
+                </a:extLst>
+              </p:cNvPr>
+              <p:cNvSpPr>
+                <a:spLocks noGrp="1" noRot="1" noChangeAspect="1" noMove="1" noResize="1" noEditPoints="1" noAdjustHandles="1" noChangeArrowheads="1" noChangeShapeType="1" noTextEdit="1"/>
+              </p:cNvSpPr>
+              <p:nvPr>
+                <p:ph idx="1"/>
+              </p:nvPr>
+            </p:nvSpPr>
+            <p:spPr>
+              <a:blipFill>
+                <a:blip r:embed="rId2"/>
+                <a:stretch>
+                  <a:fillRect l="-212"/>
+                </a:stretch>
+              </a:blipFill>
+            </p:spPr>
+            <p:txBody>
+              <a:bodyPr/>
+              <a:lstStyle/>
+              <a:p>
+                <a:r>
+                  <a:rPr lang="es-CL">
+                    <a:noFill/>
+                  </a:rPr>
+                  <a:t> </a:t>
+                </a:r>
+              </a:p>
+            </p:txBody>
+          </p:sp>
+        </mc:Fallback>
+      </mc:AlternateContent>
+    </p:spTree>
+    <p:extLst>
+      <p:ext uri="{BB962C8B-B14F-4D97-AF65-F5344CB8AC3E}">
+        <p14:creationId xmlns:p14="http://schemas.microsoft.com/office/powerpoint/2010/main" val="4026795706"/>
+      </p:ext>
+    </p:extLst>
+  </p:cSld>
+  <p:clrMapOvr>
+    <a:masterClrMapping/>
+  </p:clrMapOvr>
+</p:sld>
+</file>
+
+<file path=ppt/slides/slide17.xml><?xml version="1.0" encoding="utf-8"?>
+<p:sld xmlns:a="http://schemas.openxmlformats.org/drawingml/2006/main" xmlns:r="http://schemas.openxmlformats.org/officeDocument/2006/relationships" xmlns:p="http://schemas.openxmlformats.org/presentationml/2006/main">
+  <p:cSld>
+    <p:spTree>
+      <p:nvGrpSpPr>
+        <p:cNvPr id="1" name=""/>
+        <p:cNvGrpSpPr/>
+        <p:nvPr/>
+      </p:nvGrpSpPr>
+      <p:grpSpPr>
+        <a:xfrm>
+          <a:off x="0" y="0"/>
+          <a:ext cx="0" cy="0"/>
+          <a:chOff x="0" y="0"/>
+          <a:chExt cx="0" cy="0"/>
+        </a:xfrm>
+      </p:grpSpPr>
+      <p:sp>
+        <p:nvSpPr>
+          <p:cNvPr id="2" name="Title 1">
+            <a:extLst>
+              <a:ext uri="{FF2B5EF4-FFF2-40B4-BE49-F238E27FC236}">
+                <a16:creationId xmlns:a16="http://schemas.microsoft.com/office/drawing/2014/main" id="{25E03606-B8C8-425B-880B-0263BC41A202}"/>
+              </a:ext>
+            </a:extLst>
+          </p:cNvPr>
+          <p:cNvSpPr>
+            <a:spLocks noGrp="1"/>
+          </p:cNvSpPr>
+          <p:nvPr>
+            <p:ph type="title"/>
+          </p:nvPr>
+        </p:nvSpPr>
+        <p:spPr/>
+        <p:txBody>
+          <a:bodyPr/>
+          <a:lstStyle/>
+          <a:p>
+            <a:r>
+              <a:rPr lang="es-CL"/>
+              <a:t>Correctitud</a:t>
+            </a:r>
+            <a:endParaRPr lang="es-CL" dirty="0"/>
+          </a:p>
+        </p:txBody>
+      </p:sp>
+      <mc:AlternateContent xmlns:mc="http://schemas.openxmlformats.org/markup-compatibility/2006" xmlns:a14="http://schemas.microsoft.com/office/drawing/2010/main">
+        <mc:Choice Requires="a14">
+          <p:sp>
+            <p:nvSpPr>
+              <p:cNvPr id="3" name="Content Placeholder 2">
+                <a:extLst>
+                  <a:ext uri="{FF2B5EF4-FFF2-40B4-BE49-F238E27FC236}">
+                    <a16:creationId xmlns:a16="http://schemas.microsoft.com/office/drawing/2014/main" id="{F43B354F-97B7-429B-921B-785BCB9E0AAE}"/>
+                  </a:ext>
+                </a:extLst>
+              </p:cNvPr>
+              <p:cNvSpPr>
+                <a:spLocks noGrp="1"/>
+              </p:cNvSpPr>
+              <p:nvPr>
+                <p:ph idx="1"/>
+              </p:nvPr>
+            </p:nvSpPr>
+            <p:spPr>
+              <a:xfrm>
+                <a:off x="215948" y="1287532"/>
+                <a:ext cx="8732741" cy="4904072"/>
+              </a:xfrm>
+            </p:spPr>
+            <p:txBody>
+              <a:bodyPr>
+                <a:noAutofit/>
+              </a:bodyPr>
+              <a:lstStyle/>
+              <a:p>
+                <a:pPr marL="0" indent="0">
+                  <a:buNone/>
+                </a:pPr>
+                <a:r>
+                  <a:rPr lang="es-CL" sz="2200" dirty="0"/>
+                  <a:t>PD: Al terminar el </a:t>
+                </a:r>
+                <a14:m>
+                  <m:oMath xmlns:m="http://schemas.openxmlformats.org/officeDocument/2006/math">
+                    <m:r>
+                      <a:rPr lang="es-CL" sz="2200" dirty="0" smtClean="0">
+                        <a:latin typeface="Cambria Math" panose="02040503050406030204" pitchFamily="18" charset="0"/>
+                      </a:rPr>
+                      <m:t>𝑖</m:t>
+                    </m:r>
+                  </m:oMath>
+                </a14:m>
+                <a:r>
+                  <a:rPr lang="es-CL" sz="2200" dirty="0"/>
+                  <a:t>-</a:t>
+                </a:r>
+                <a:r>
+                  <a:rPr lang="es-CL" sz="2200" dirty="0" err="1"/>
+                  <a:t>ésimo</a:t>
+                </a:r>
+                <a:r>
+                  <a:rPr lang="es-CL" sz="2200" dirty="0"/>
+                  <a:t> paso, </a:t>
+                </a:r>
+                <a14:m>
+                  <m:oMath xmlns:m="http://schemas.openxmlformats.org/officeDocument/2006/math">
+                    <m:r>
+                      <a:rPr lang="es-CL" sz="2200" smtClean="0">
+                        <a:latin typeface="Cambria Math" panose="02040503050406030204" pitchFamily="18" charset="0"/>
+                      </a:rPr>
+                      <m:t>𝐵</m:t>
+                    </m:r>
+                  </m:oMath>
+                </a14:m>
+                <a:r>
+                  <a:rPr lang="es-CL" sz="2200" dirty="0"/>
+                  <a:t> se encuentra ordenada</a:t>
+                </a:r>
+              </a:p>
+              <a:p>
+                <a:pPr marL="0" indent="0">
+                  <a:buNone/>
+                </a:pPr>
+                <a:r>
+                  <a:rPr lang="es-CL" sz="2200" dirty="0"/>
+                  <a:t>Por </a:t>
+                </a:r>
+                <a:r>
+                  <a:rPr lang="es-CL" sz="2200" b="1" dirty="0">
+                    <a:solidFill>
+                      <a:schemeClr val="accent2"/>
+                    </a:solidFill>
+                  </a:rPr>
+                  <a:t>inducción</a:t>
+                </a:r>
+                <a:r>
+                  <a:rPr lang="es-CL" sz="2200" dirty="0"/>
+                  <a:t> sobre </a:t>
+                </a:r>
+                <a14:m>
+                  <m:oMath xmlns:m="http://schemas.openxmlformats.org/officeDocument/2006/math">
+                    <m:r>
+                      <a:rPr lang="es-CL" sz="2200" dirty="0" smtClean="0">
+                        <a:latin typeface="Cambria Math" panose="02040503050406030204" pitchFamily="18" charset="0"/>
+                      </a:rPr>
+                      <m:t>𝑖</m:t>
+                    </m:r>
+                  </m:oMath>
+                </a14:m>
+                <a:endParaRPr lang="es-CL" sz="2200" dirty="0"/>
+              </a:p>
+              <a:p>
+                <a:pPr marL="0" indent="0">
+                  <a:buNone/>
+                </a:pPr>
+                <a:r>
+                  <a:rPr lang="es-CL" sz="2200" b="1" dirty="0"/>
+                  <a:t>Caso Base</a:t>
+                </a:r>
+                <a:r>
+                  <a:rPr lang="es-CL" sz="2200" dirty="0"/>
+                  <a:t>: Después del paso 1, </a:t>
+                </a:r>
+                <a14:m>
+                  <m:oMath xmlns:m="http://schemas.openxmlformats.org/officeDocument/2006/math">
+                    <m:r>
+                      <a:rPr lang="es-CL" sz="2200" b="0" i="1" smtClean="0">
+                        <a:latin typeface="Cambria Math" panose="02040503050406030204" pitchFamily="18" charset="0"/>
+                      </a:rPr>
+                      <m:t>𝐵</m:t>
+                    </m:r>
+                  </m:oMath>
+                </a14:m>
+                <a:r>
+                  <a:rPr lang="es-CL" sz="2200" dirty="0"/>
+                  <a:t> tiene un solo dato </a:t>
+                </a:r>
+                <a14:m>
+                  <m:oMath xmlns:m="http://schemas.openxmlformats.org/officeDocument/2006/math">
+                    <m:r>
+                      <a:rPr lang="es-CL" sz="2200" b="0" i="1" smtClean="0">
+                        <a:latin typeface="Cambria Math" panose="02040503050406030204" pitchFamily="18" charset="0"/>
+                      </a:rPr>
+                      <m:t>→</m:t>
+                    </m:r>
+                  </m:oMath>
+                </a14:m>
+                <a:r>
+                  <a:rPr lang="es-CL" sz="2200" dirty="0"/>
+                  <a:t> </a:t>
+                </a:r>
+                <a14:m>
+                  <m:oMath xmlns:m="http://schemas.openxmlformats.org/officeDocument/2006/math">
+                    <m:r>
+                      <a:rPr lang="es-CL" sz="2200" b="0" i="1" dirty="0" smtClean="0">
+                        <a:latin typeface="Cambria Math" panose="02040503050406030204" pitchFamily="18" charset="0"/>
+                      </a:rPr>
+                      <m:t>𝐵</m:t>
+                    </m:r>
+                  </m:oMath>
+                </a14:m>
+                <a:r>
+                  <a:rPr lang="es-CL" sz="2200" dirty="0"/>
+                  <a:t> está ordenada</a:t>
+                </a:r>
+              </a:p>
+              <a:p>
+                <a:pPr marL="0" indent="0">
+                  <a:buNone/>
+                </a:pPr>
+                <a:r>
+                  <a:rPr lang="es-CL" sz="2200" b="1"/>
+                  <a:t>Hipótesis Inductiva: </a:t>
+                </a:r>
+                <a:r>
+                  <a:rPr lang="es-CL" sz="2200" dirty="0"/>
+                  <a:t>Después del paso </a:t>
+                </a:r>
+                <a14:m>
+                  <m:oMath xmlns:m="http://schemas.openxmlformats.org/officeDocument/2006/math">
+                    <m:r>
+                      <a:rPr lang="es-CL" sz="2200" b="0" i="1" smtClean="0">
+                        <a:latin typeface="Cambria Math" panose="02040503050406030204" pitchFamily="18" charset="0"/>
+                      </a:rPr>
+                      <m:t>𝑖</m:t>
+                    </m:r>
+                  </m:oMath>
+                </a14:m>
+                <a:r>
+                  <a:rPr lang="es-CL" sz="2200" b="1" dirty="0"/>
+                  <a:t>, </a:t>
+                </a:r>
+                <a14:m>
+                  <m:oMath xmlns:m="http://schemas.openxmlformats.org/officeDocument/2006/math">
+                    <m:r>
+                      <a:rPr lang="es-CL" sz="2200" b="0" i="1" smtClean="0">
+                        <a:latin typeface="Cambria Math" panose="02040503050406030204" pitchFamily="18" charset="0"/>
+                      </a:rPr>
+                      <m:t>𝐵</m:t>
+                    </m:r>
+                  </m:oMath>
+                </a14:m>
+                <a:r>
+                  <a:rPr lang="es-CL" sz="2200" dirty="0"/>
+                  <a:t> está ordenada</a:t>
+                </a:r>
+              </a:p>
+              <a:p>
+                <a:pPr marL="0" indent="0">
+                  <a:buNone/>
+                </a:pPr>
+                <a:r>
+                  <a:rPr lang="es-CL" sz="2200" dirty="0"/>
+                  <a:t>Toca el paso </a:t>
+                </a:r>
+                <a14:m>
+                  <m:oMath xmlns:m="http://schemas.openxmlformats.org/officeDocument/2006/math">
+                    <m:r>
+                      <a:rPr lang="es-CL" sz="2200" b="0" i="1" smtClean="0">
+                        <a:latin typeface="Cambria Math" panose="02040503050406030204" pitchFamily="18" charset="0"/>
+                      </a:rPr>
+                      <m:t>𝑖</m:t>
+                    </m:r>
+                    <m:r>
+                      <a:rPr lang="es-CL" sz="2200" b="0" i="1" smtClean="0">
+                        <a:latin typeface="Cambria Math" panose="02040503050406030204" pitchFamily="18" charset="0"/>
+                      </a:rPr>
+                      <m:t>+1</m:t>
+                    </m:r>
+                  </m:oMath>
+                </a14:m>
+                <a:r>
+                  <a:rPr lang="es-CL" sz="2200" dirty="0"/>
+                  <a:t>. Extraemos el primer elemento de </a:t>
+                </a:r>
+                <a14:m>
+                  <m:oMath xmlns:m="http://schemas.openxmlformats.org/officeDocument/2006/math">
+                    <m:r>
+                      <a:rPr lang="es-CL" sz="2200" b="0" i="1" smtClean="0">
+                        <a:latin typeface="Cambria Math" panose="02040503050406030204" pitchFamily="18" charset="0"/>
+                      </a:rPr>
+                      <m:t>𝐴</m:t>
+                    </m:r>
+                  </m:oMath>
+                </a14:m>
+                <a:r>
+                  <a:rPr lang="es-CL" sz="2200" dirty="0"/>
+                  <a:t>, y lo insertamos ordenadamente en </a:t>
+                </a:r>
+                <a14:m>
+                  <m:oMath xmlns:m="http://schemas.openxmlformats.org/officeDocument/2006/math">
+                    <m:r>
+                      <a:rPr lang="es-CL" sz="2200" b="0" i="1" smtClean="0">
+                        <a:latin typeface="Cambria Math" panose="02040503050406030204" pitchFamily="18" charset="0"/>
+                      </a:rPr>
+                      <m:t>𝐵</m:t>
+                    </m:r>
+                  </m:oMath>
+                </a14:m>
+                <a:r>
+                  <a:rPr lang="es-CL" sz="2200" dirty="0"/>
+                  <a:t>. Termina el paso </a:t>
+                </a:r>
+                <a14:m>
+                  <m:oMath xmlns:m="http://schemas.openxmlformats.org/officeDocument/2006/math">
+                    <m:r>
+                      <a:rPr lang="es-CL" sz="2200" b="0" i="1" smtClean="0">
+                        <a:latin typeface="Cambria Math" panose="02040503050406030204" pitchFamily="18" charset="0"/>
+                      </a:rPr>
+                      <m:t>𝑖</m:t>
+                    </m:r>
+                    <m:r>
+                      <a:rPr lang="es-CL" sz="2200" b="0" i="1" smtClean="0">
+                        <a:latin typeface="Cambria Math" panose="02040503050406030204" pitchFamily="18" charset="0"/>
+                      </a:rPr>
+                      <m:t>+1</m:t>
+                    </m:r>
+                  </m:oMath>
+                </a14:m>
+                <a:r>
+                  <a:rPr lang="es-CL" sz="2200" dirty="0"/>
+                  <a:t>. Si la </a:t>
+                </a:r>
+                <a:r>
+                  <a:rPr lang="es-CL" sz="2200" b="1" dirty="0">
+                    <a:solidFill>
+                      <a:schemeClr val="accent4"/>
+                    </a:solidFill>
+                  </a:rPr>
+                  <a:t>inserción</a:t>
+                </a:r>
+                <a:r>
+                  <a:rPr lang="es-CL" sz="2200" dirty="0"/>
+                  <a:t> fue correcta, entonces </a:t>
+                </a:r>
+                <a14:m>
+                  <m:oMath xmlns:m="http://schemas.openxmlformats.org/officeDocument/2006/math">
+                    <m:r>
+                      <a:rPr lang="es-CL" sz="2200" b="0" i="1" smtClean="0">
+                        <a:latin typeface="Cambria Math" panose="02040503050406030204" pitchFamily="18" charset="0"/>
+                      </a:rPr>
+                      <m:t>𝐵</m:t>
+                    </m:r>
+                  </m:oMath>
+                </a14:m>
+                <a:r>
+                  <a:rPr lang="es-CL" sz="2200" dirty="0"/>
+                  <a:t> está ordenada.</a:t>
+                </a:r>
+              </a:p>
+              <a:p>
+                <a:pPr marL="0" indent="0">
+                  <a:buNone/>
+                </a:pPr>
+                <a:r>
+                  <a:rPr lang="es-CL" sz="2200" dirty="0"/>
+                  <a:t>En particular, al terminar el algoritmo después del paso </a:t>
+                </a:r>
+                <a14:m>
+                  <m:oMath xmlns:m="http://schemas.openxmlformats.org/officeDocument/2006/math">
+                    <m:r>
+                      <a:rPr lang="es-CL" sz="2200" b="0" i="1" smtClean="0">
+                        <a:latin typeface="Cambria Math" panose="02040503050406030204" pitchFamily="18" charset="0"/>
+                      </a:rPr>
+                      <m:t>𝑛</m:t>
+                    </m:r>
+                  </m:oMath>
+                </a14:m>
+                <a:r>
+                  <a:rPr lang="es-CL" sz="2200" dirty="0"/>
+                  <a:t>, </a:t>
+                </a:r>
+                <a14:m>
+                  <m:oMath xmlns:m="http://schemas.openxmlformats.org/officeDocument/2006/math">
+                    <m:r>
+                      <a:rPr lang="es-CL" sz="2200" b="0" i="1" smtClean="0">
+                        <a:latin typeface="Cambria Math" panose="02040503050406030204" pitchFamily="18" charset="0"/>
+                      </a:rPr>
+                      <m:t>𝐵</m:t>
+                    </m:r>
+                  </m:oMath>
+                </a14:m>
+                <a:r>
+                  <a:rPr lang="es-CL" sz="2200" dirty="0"/>
+                  <a:t> está ordenada.</a:t>
+                </a:r>
+              </a:p>
+              <a:p>
+                <a:endParaRPr lang="es-CL" sz="2200" dirty="0"/>
+              </a:p>
+            </p:txBody>
+          </p:sp>
+        </mc:Choice>
+        <mc:Fallback xmlns="">
+          <p:sp>
+            <p:nvSpPr>
+              <p:cNvPr id="3" name="Content Placeholder 2">
+                <a:extLst>
+                  <a:ext uri="{FF2B5EF4-FFF2-40B4-BE49-F238E27FC236}">
+                    <a16:creationId xmlns:a16="http://schemas.microsoft.com/office/drawing/2014/main" id="{F43B354F-97B7-429B-921B-785BCB9E0AAE}"/>
+                  </a:ext>
+                </a:extLst>
+              </p:cNvPr>
+              <p:cNvSpPr>
+                <a:spLocks noGrp="1" noRot="1" noChangeAspect="1" noMove="1" noResize="1" noEditPoints="1" noAdjustHandles="1" noChangeArrowheads="1" noChangeShapeType="1" noTextEdit="1"/>
+              </p:cNvSpPr>
+              <p:nvPr>
+                <p:ph idx="1"/>
+              </p:nvPr>
+            </p:nvSpPr>
+            <p:spPr>
+              <a:xfrm>
+                <a:off x="215948" y="1287532"/>
+                <a:ext cx="8732741" cy="4904072"/>
+              </a:xfrm>
+              <a:blipFill>
+                <a:blip r:embed="rId3"/>
+                <a:stretch>
+                  <a:fillRect l="-907" r="-837" b="-3478"/>
+                </a:stretch>
+              </a:blipFill>
+            </p:spPr>
+            <p:txBody>
+              <a:bodyPr/>
+              <a:lstStyle/>
+              <a:p>
+                <a:r>
+                  <a:rPr lang="es-CL">
+                    <a:noFill/>
+                  </a:rPr>
+                  <a:t> </a:t>
+                </a:r>
+              </a:p>
+            </p:txBody>
+          </p:sp>
+        </mc:Fallback>
+      </mc:AlternateContent>
+    </p:spTree>
+    <p:extLst>
+      <p:ext uri="{BB962C8B-B14F-4D97-AF65-F5344CB8AC3E}">
+        <p14:creationId xmlns:p14="http://schemas.microsoft.com/office/powerpoint/2010/main" val="2783425152"/>
+      </p:ext>
+    </p:extLst>
+  </p:cSld>
+  <p:clrMapOvr>
+    <a:masterClrMapping/>
+  </p:clrMapOvr>
+</p:sld>
+</file>
+
+<file path=ppt/slides/slide18.xml><?xml version="1.0" encoding="utf-8"?>
+<p:sld xmlns:a="http://schemas.openxmlformats.org/drawingml/2006/main" xmlns:r="http://schemas.openxmlformats.org/officeDocument/2006/relationships" xmlns:p="http://schemas.openxmlformats.org/presentationml/2006/main">
+  <p:cSld>
+    <p:spTree>
+      <p:nvGrpSpPr>
+        <p:cNvPr id="1" name=""/>
+        <p:cNvGrpSpPr/>
+        <p:nvPr/>
+      </p:nvGrpSpPr>
+      <p:grpSpPr>
+        <a:xfrm>
+          <a:off x="0" y="0"/>
+          <a:ext cx="0" cy="0"/>
+          <a:chOff x="0" y="0"/>
+          <a:chExt cx="0" cy="0"/>
+        </a:xfrm>
+      </p:grpSpPr>
+      <p:sp>
+        <p:nvSpPr>
+          <p:cNvPr id="2" name="Title 1">
+            <a:extLst>
+              <a:ext uri="{FF2B5EF4-FFF2-40B4-BE49-F238E27FC236}">
+                <a16:creationId xmlns:a16="http://schemas.microsoft.com/office/drawing/2014/main" id="{569E5831-E37D-4180-A88F-80168EF1427C}"/>
+              </a:ext>
+            </a:extLst>
+          </p:cNvPr>
+          <p:cNvSpPr>
+            <a:spLocks noGrp="1"/>
+          </p:cNvSpPr>
+          <p:nvPr>
+            <p:ph type="title"/>
+          </p:nvPr>
+        </p:nvSpPr>
+        <p:spPr/>
+        <p:txBody>
+          <a:bodyPr>
+            <a:normAutofit/>
+          </a:bodyPr>
+          <a:lstStyle/>
+          <a:p>
+            <a:r>
+              <a:rPr lang="es-CL"/>
+              <a:t>¿Cómo se hace una inserción?</a:t>
+            </a:r>
+            <a:endParaRPr lang="es-CL" dirty="0"/>
+          </a:p>
+        </p:txBody>
+      </p:sp>
+      <p:sp>
+        <p:nvSpPr>
+          <p:cNvPr id="4" name="Content Placeholder 3">
+            <a:extLst>
+              <a:ext uri="{FF2B5EF4-FFF2-40B4-BE49-F238E27FC236}">
+                <a16:creationId xmlns:a16="http://schemas.microsoft.com/office/drawing/2014/main" id="{15693FFC-207A-4FF8-B2AE-E9F5389A2A92}"/>
+              </a:ext>
+            </a:extLst>
+          </p:cNvPr>
+          <p:cNvSpPr>
+            <a:spLocks noGrp="1"/>
+          </p:cNvSpPr>
+          <p:nvPr>
+            <p:ph idx="1"/>
+          </p:nvPr>
+        </p:nvSpPr>
+        <p:spPr>
+          <a:xfrm>
+            <a:off x="251461" y="1824419"/>
+            <a:ext cx="8641076" cy="4273222"/>
+          </a:xfrm>
+        </p:spPr>
+        <p:txBody>
+          <a:bodyPr anchor="ctr">
+            <a:normAutofit/>
+          </a:bodyPr>
+          <a:lstStyle/>
+          <a:p>
+            <a:pPr>
+              <a:lnSpc>
+                <a:spcPct val="100000"/>
+              </a:lnSpc>
+            </a:pPr>
+            <a:r>
+              <a:rPr lang="es-CL" dirty="0"/>
+              <a:t>Depende de la estructura de datos usada para almacenar la lista</a:t>
+            </a:r>
+          </a:p>
+          <a:p>
+            <a:pPr>
+              <a:lnSpc>
+                <a:spcPct val="100000"/>
+              </a:lnSpc>
+            </a:pPr>
+            <a:endParaRPr lang="es-CL" dirty="0"/>
+          </a:p>
+          <a:p>
+            <a:pPr>
+              <a:lnSpc>
+                <a:spcPct val="100000"/>
+              </a:lnSpc>
+            </a:pPr>
+            <a:r>
+              <a:rPr lang="es-CL" dirty="0"/>
+              <a:t>Se suele usar </a:t>
+            </a:r>
+            <a:r>
+              <a:rPr lang="es-CL" b="1" dirty="0">
+                <a:solidFill>
+                  <a:schemeClr val="accent2"/>
+                </a:solidFill>
+              </a:rPr>
+              <a:t>arreglos</a:t>
+            </a:r>
+            <a:r>
+              <a:rPr lang="es-CL" dirty="0"/>
+              <a:t>, pero también se puede usar </a:t>
+            </a:r>
+            <a:r>
+              <a:rPr lang="es-CL" b="1" dirty="0">
+                <a:solidFill>
+                  <a:schemeClr val="accent2"/>
+                </a:solidFill>
+              </a:rPr>
+              <a:t>listas ligadas</a:t>
+            </a:r>
+          </a:p>
+          <a:p>
+            <a:pPr>
+              <a:lnSpc>
+                <a:spcPct val="100000"/>
+              </a:lnSpc>
+            </a:pPr>
+            <a:endParaRPr lang="es-CL" dirty="0"/>
+          </a:p>
+          <a:p>
+            <a:pPr>
+              <a:lnSpc>
+                <a:spcPct val="100000"/>
+              </a:lnSpc>
+            </a:pPr>
+            <a:r>
+              <a:rPr lang="es-CL" dirty="0"/>
+              <a:t>En cualquier caso, el algoritmo no necesita memoria adicional</a:t>
+            </a:r>
+          </a:p>
+        </p:txBody>
+      </p:sp>
+    </p:spTree>
+    <p:extLst>
+      <p:ext uri="{BB962C8B-B14F-4D97-AF65-F5344CB8AC3E}">
+        <p14:creationId xmlns:p14="http://schemas.microsoft.com/office/powerpoint/2010/main" val="2362549278"/>
+      </p:ext>
+    </p:extLst>
+  </p:cSld>
+  <p:clrMapOvr>
+    <a:masterClrMapping/>
+  </p:clrMapOvr>
+</p:sld>
+</file>
+
+<file path=ppt/slides/slide19.xml><?xml version="1.0" encoding="utf-8"?>
+<p:sld xmlns:a="http://schemas.openxmlformats.org/drawingml/2006/main" xmlns:r="http://schemas.openxmlformats.org/officeDocument/2006/relationships" xmlns:p="http://schemas.openxmlformats.org/presentationml/2006/main">
+  <p:cSld>
+    <p:spTree>
+      <p:nvGrpSpPr>
+        <p:cNvPr id="1" name=""/>
+        <p:cNvGrpSpPr/>
+        <p:nvPr/>
+      </p:nvGrpSpPr>
+      <p:grpSpPr>
+        <a:xfrm>
+          <a:off x="0" y="0"/>
+          <a:ext cx="0" cy="0"/>
+          <a:chOff x="0" y="0"/>
+          <a:chExt cx="0" cy="0"/>
+        </a:xfrm>
+      </p:grpSpPr>
+      <p:sp>
+        <p:nvSpPr>
+          <p:cNvPr id="2" name="Title 1">
+            <a:extLst>
+              <a:ext uri="{FF2B5EF4-FFF2-40B4-BE49-F238E27FC236}">
                 <a16:creationId xmlns:a16="http://schemas.microsoft.com/office/drawing/2014/main" id="{232649FA-7B44-43DF-BE6B-697D23F41015}"/>
               </a:ext>
             </a:extLst>
@@ -5227,7 +6218,73 @@
 </p:sld>
 </file>
 
-<file path=ppt/slides/slide17.xml><?xml version="1.0" encoding="utf-8"?>
+<file path=ppt/slides/slide2.xml><?xml version="1.0" encoding="utf-8"?>
+<p:sld xmlns:a="http://schemas.openxmlformats.org/drawingml/2006/main" xmlns:r="http://schemas.openxmlformats.org/officeDocument/2006/relationships" xmlns:p="http://schemas.openxmlformats.org/presentationml/2006/main">
+  <p:cSld>
+    <p:spTree>
+      <p:nvGrpSpPr>
+        <p:cNvPr id="1" name=""/>
+        <p:cNvGrpSpPr/>
+        <p:nvPr/>
+      </p:nvGrpSpPr>
+      <p:grpSpPr>
+        <a:xfrm>
+          <a:off x="0" y="0"/>
+          <a:ext cx="0" cy="0"/>
+          <a:chOff x="0" y="0"/>
+          <a:chExt cx="0" cy="0"/>
+        </a:xfrm>
+      </p:grpSpPr>
+      <p:pic>
+        <p:nvPicPr>
+          <p:cNvPr id="6" name="Picture 5">
+            <a:extLst>
+              <a:ext uri="{FF2B5EF4-FFF2-40B4-BE49-F238E27FC236}">
+                <a16:creationId xmlns:a16="http://schemas.microsoft.com/office/drawing/2014/main" id="{91896E5A-D565-4C7A-A653-68C94DBFBCF7}"/>
+              </a:ext>
+            </a:extLst>
+          </p:cNvPr>
+          <p:cNvPicPr>
+            <a:picLocks noChangeAspect="1"/>
+          </p:cNvPicPr>
+          <p:nvPr/>
+        </p:nvPicPr>
+        <p:blipFill>
+          <a:blip r:embed="rId3">
+            <a:extLst>
+              <a:ext uri="{28A0092B-C50C-407E-A947-70E740481C1C}">
+                <a14:useLocalDpi xmlns:a14="http://schemas.microsoft.com/office/drawing/2010/main" val="0"/>
+              </a:ext>
+            </a:extLst>
+          </a:blip>
+          <a:stretch>
+            <a:fillRect/>
+          </a:stretch>
+        </p:blipFill>
+        <p:spPr>
+          <a:xfrm>
+            <a:off x="-2560320" y="-2857500"/>
+            <a:ext cx="12954000" cy="9715500"/>
+          </a:xfrm>
+          <a:prstGeom prst="rect">
+            <a:avLst/>
+          </a:prstGeom>
+        </p:spPr>
+      </p:pic>
+    </p:spTree>
+    <p:extLst>
+      <p:ext uri="{BB962C8B-B14F-4D97-AF65-F5344CB8AC3E}">
+        <p14:creationId xmlns:p14="http://schemas.microsoft.com/office/powerpoint/2010/main" val="3225115779"/>
+      </p:ext>
+    </p:extLst>
+  </p:cSld>
+  <p:clrMapOvr>
+    <a:masterClrMapping/>
+  </p:clrMapOvr>
+</p:sld>
+</file>
+
+<file path=ppt/slides/slide20.xml><?xml version="1.0" encoding="utf-8"?>
 <p:sld xmlns:a="http://schemas.openxmlformats.org/drawingml/2006/main" xmlns:r="http://schemas.openxmlformats.org/officeDocument/2006/relationships" xmlns:p="http://schemas.openxmlformats.org/presentationml/2006/main">
   <p:cSld>
     <p:spTree>
@@ -5538,7 +6595,7 @@
 </p:sld>
 </file>
 
-<file path=ppt/slides/slide18.xml><?xml version="1.0" encoding="utf-8"?>
+<file path=ppt/slides/slide21.xml><?xml version="1.0" encoding="utf-8"?>
 <p:sld xmlns:a="http://schemas.openxmlformats.org/drawingml/2006/main" xmlns:r="http://schemas.openxmlformats.org/officeDocument/2006/relationships" xmlns:p="http://schemas.openxmlformats.org/presentationml/2006/main">
   <p:cSld>
     <p:spTree>
@@ -5585,8 +6642,8 @@
           </a:p>
         </p:txBody>
       </p:sp>
-      <mc:AlternateContent xmlns:mc="http://schemas.openxmlformats.org/markup-compatibility/2006">
-        <mc:Choice xmlns:a14="http://schemas.microsoft.com/office/drawing/2010/main" Requires="a14">
+      <mc:AlternateContent xmlns:mc="http://schemas.openxmlformats.org/markup-compatibility/2006" xmlns:a14="http://schemas.microsoft.com/office/drawing/2010/main">
+        <mc:Choice Requires="a14">
           <p:sp>
             <p:nvSpPr>
               <p:cNvPr id="3" name="Content Placeholder 2">
@@ -5769,7 +6826,7 @@
             </p:txBody>
           </p:sp>
         </mc:Choice>
-        <mc:Fallback>
+        <mc:Fallback xmlns="">
           <p:sp>
             <p:nvSpPr>
               <p:cNvPr id="3" name="Content Placeholder 2">
@@ -5822,7 +6879,7 @@
 </p:sld>
 </file>
 
-<file path=ppt/slides/slide19.xml><?xml version="1.0" encoding="utf-8"?>
+<file path=ppt/slides/slide22.xml><?xml version="1.0" encoding="utf-8"?>
 <p:sld xmlns:a="http://schemas.openxmlformats.org/drawingml/2006/main" xmlns:r="http://schemas.openxmlformats.org/officeDocument/2006/relationships" xmlns:p="http://schemas.openxmlformats.org/presentationml/2006/main">
   <p:cSld>
     <p:spTree>
@@ -5871,8 +6928,8 @@
           </a:p>
         </p:txBody>
       </p:sp>
-      <mc:AlternateContent xmlns:mc="http://schemas.openxmlformats.org/markup-compatibility/2006">
-        <mc:Choice xmlns:a14="http://schemas.microsoft.com/office/drawing/2010/main" Requires="a14">
+      <mc:AlternateContent xmlns:mc="http://schemas.openxmlformats.org/markup-compatibility/2006" xmlns:a14="http://schemas.microsoft.com/office/drawing/2010/main">
+        <mc:Choice Requires="a14">
           <p:sp>
             <p:nvSpPr>
               <p:cNvPr id="3" name="Content Placeholder 2">
@@ -6078,7 +7135,7 @@
             </p:txBody>
           </p:sp>
         </mc:Choice>
-        <mc:Fallback>
+        <mc:Fallback xmlns="">
           <p:sp>
             <p:nvSpPr>
               <p:cNvPr id="3" name="Content Placeholder 2">
@@ -6122,72 +7179,6 @@
     <p:extLst>
       <p:ext uri="{BB962C8B-B14F-4D97-AF65-F5344CB8AC3E}">
         <p14:creationId xmlns:p14="http://schemas.microsoft.com/office/powerpoint/2010/main" val="2099685834"/>
-      </p:ext>
-    </p:extLst>
-  </p:cSld>
-  <p:clrMapOvr>
-    <a:masterClrMapping/>
-  </p:clrMapOvr>
-</p:sld>
-</file>
-
-<file path=ppt/slides/slide2.xml><?xml version="1.0" encoding="utf-8"?>
-<p:sld xmlns:a="http://schemas.openxmlformats.org/drawingml/2006/main" xmlns:r="http://schemas.openxmlformats.org/officeDocument/2006/relationships" xmlns:p="http://schemas.openxmlformats.org/presentationml/2006/main">
-  <p:cSld>
-    <p:spTree>
-      <p:nvGrpSpPr>
-        <p:cNvPr id="1" name=""/>
-        <p:cNvGrpSpPr/>
-        <p:nvPr/>
-      </p:nvGrpSpPr>
-      <p:grpSpPr>
-        <a:xfrm>
-          <a:off x="0" y="0"/>
-          <a:ext cx="0" cy="0"/>
-          <a:chOff x="0" y="0"/>
-          <a:chExt cx="0" cy="0"/>
-        </a:xfrm>
-      </p:grpSpPr>
-      <p:pic>
-        <p:nvPicPr>
-          <p:cNvPr id="6" name="Picture 5">
-            <a:extLst>
-              <a:ext uri="{FF2B5EF4-FFF2-40B4-BE49-F238E27FC236}">
-                <a16:creationId xmlns:a16="http://schemas.microsoft.com/office/drawing/2014/main" id="{91896E5A-D565-4C7A-A653-68C94DBFBCF7}"/>
-              </a:ext>
-            </a:extLst>
-          </p:cNvPr>
-          <p:cNvPicPr>
-            <a:picLocks noChangeAspect="1"/>
-          </p:cNvPicPr>
-          <p:nvPr/>
-        </p:nvPicPr>
-        <p:blipFill>
-          <a:blip r:embed="rId3">
-            <a:extLst>
-              <a:ext uri="{28A0092B-C50C-407E-A947-70E740481C1C}">
-                <a14:useLocalDpi xmlns:a14="http://schemas.microsoft.com/office/drawing/2010/main" val="0"/>
-              </a:ext>
-            </a:extLst>
-          </a:blip>
-          <a:stretch>
-            <a:fillRect/>
-          </a:stretch>
-        </p:blipFill>
-        <p:spPr>
-          <a:xfrm>
-            <a:off x="-2560320" y="-2857500"/>
-            <a:ext cx="12954000" cy="9715500"/>
-          </a:xfrm>
-          <a:prstGeom prst="rect">
-            <a:avLst/>
-          </a:prstGeom>
-        </p:spPr>
-      </p:pic>
-    </p:spTree>
-    <p:extLst>
-      <p:ext uri="{BB962C8B-B14F-4D97-AF65-F5344CB8AC3E}">
-        <p14:creationId xmlns:p14="http://schemas.microsoft.com/office/powerpoint/2010/main" val="3225115779"/>
       </p:ext>
     </p:extLst>
   </p:cSld>

</xml_diff>